<commit_message>
update ppt and update training, validation and testing splitting
</commit_message>
<xml_diff>
--- a/paper/project deep learning.pptx
+++ b/paper/project deep learning.pptx
@@ -14,8 +14,8 @@
     <p:sldId id="262" r:id="rId8"/>
     <p:sldId id="263" r:id="rId9"/>
     <p:sldId id="264" r:id="rId10"/>
-    <p:sldId id="265" r:id="rId11"/>
-    <p:sldId id="267" r:id="rId12"/>
+    <p:sldId id="267" r:id="rId11"/>
+    <p:sldId id="265" r:id="rId12"/>
     <p:sldId id="266" r:id="rId13"/>
   </p:sldIdLst>
   <p:sldSz cx="12192000" cy="6858000"/>
@@ -117,7 +117,7 @@
   </p:defaultTextStyle>
   <p:extLst>
     <p:ext uri="{EFAFB233-063F-42B5-8137-9DF3F51BA10A}">
-      <p15:sldGuideLst xmlns:p15="http://schemas.microsoft.com/office/powerpoint/2012/main" xmlns=""/>
+      <p15:sldGuideLst xmlns="" xmlns:p15="http://schemas.microsoft.com/office/powerpoint/2012/main"/>
     </p:ext>
   </p:extLst>
 </p:presentation>
@@ -9964,7 +9964,7 @@
           <p:cNvPr id="2" name="Title 1">
             <a:extLst>
               <a:ext uri="{FF2B5EF4-FFF2-40B4-BE49-F238E27FC236}">
-                <a16:creationId xmlns:a16="http://schemas.microsoft.com/office/drawing/2014/main" xmlns="" id="{8DA71A20-5931-4822-84F2-A7DDE019A2F5}"/>
+                <a16:creationId xmlns="" xmlns:a16="http://schemas.microsoft.com/office/drawing/2014/main" id="{8DA71A20-5931-4822-84F2-A7DDE019A2F5}"/>
               </a:ext>
             </a:extLst>
           </p:cNvPr>
@@ -10000,7 +10000,7 @@
           <p:cNvPr id="3" name="Subtitle 2">
             <a:extLst>
               <a:ext uri="{FF2B5EF4-FFF2-40B4-BE49-F238E27FC236}">
-                <a16:creationId xmlns:a16="http://schemas.microsoft.com/office/drawing/2014/main" xmlns="" id="{AD603937-5A45-415C-A651-E2349952A4CD}"/>
+                <a16:creationId xmlns="" xmlns:a16="http://schemas.microsoft.com/office/drawing/2014/main" id="{AD603937-5A45-415C-A651-E2349952A4CD}"/>
               </a:ext>
             </a:extLst>
           </p:cNvPr>
@@ -10101,7 +10101,7 @@
           <p:cNvPr id="5" name="TextBox 4">
             <a:extLst>
               <a:ext uri="{FF2B5EF4-FFF2-40B4-BE49-F238E27FC236}">
-                <a16:creationId xmlns:a16="http://schemas.microsoft.com/office/drawing/2014/main" xmlns="" id="{A731A7C8-D1F0-3FDC-BEF1-CCF8DF51F199}"/>
+                <a16:creationId xmlns="" xmlns:a16="http://schemas.microsoft.com/office/drawing/2014/main" id="{A731A7C8-D1F0-3FDC-BEF1-CCF8DF51F199}"/>
               </a:ext>
             </a:extLst>
           </p:cNvPr>
@@ -10232,7 +10232,183 @@
           <p:cNvPr id="2" name="Title 1">
             <a:extLst>
               <a:ext uri="{FF2B5EF4-FFF2-40B4-BE49-F238E27FC236}">
-                <a16:creationId xmlns:a16="http://schemas.microsoft.com/office/drawing/2014/main" xmlns="" id="{39151075-A8D7-7AF7-018D-6CA6C93D178A}"/>
+                <a16:creationId xmlns="" xmlns:a16="http://schemas.microsoft.com/office/drawing/2014/main" id="{29C94A25-1010-C357-7BC4-494BA9F7A98B}"/>
+              </a:ext>
+            </a:extLst>
+          </p:cNvPr>
+          <p:cNvSpPr>
+            <a:spLocks noGrp="1"/>
+          </p:cNvSpPr>
+          <p:nvPr>
+            <p:ph type="title"/>
+          </p:nvPr>
+        </p:nvSpPr>
+        <p:spPr>
+          <a:xfrm>
+            <a:off x="1448800" y="320337"/>
+            <a:ext cx="10018713" cy="1752599"/>
+          </a:xfrm>
+        </p:spPr>
+        <p:txBody>
+          <a:bodyPr/>
+          <a:lstStyle/>
+          <a:p>
+            <a:r>
+              <a:rPr lang="en-US" dirty="0"/>
+              <a:t>System Implementation </a:t>
+            </a:r>
+          </a:p>
+        </p:txBody>
+      </p:sp>
+      <p:sp>
+        <p:nvSpPr>
+          <p:cNvPr id="3" name="Content Placeholder 2">
+            <a:extLst>
+              <a:ext uri="{FF2B5EF4-FFF2-40B4-BE49-F238E27FC236}">
+                <a16:creationId xmlns="" xmlns:a16="http://schemas.microsoft.com/office/drawing/2014/main" id="{91F0C63E-1E76-FC31-4D56-9C494553AAA7}"/>
+              </a:ext>
+            </a:extLst>
+          </p:cNvPr>
+          <p:cNvSpPr>
+            <a:spLocks noGrp="1"/>
+          </p:cNvSpPr>
+          <p:nvPr>
+            <p:ph idx="1"/>
+          </p:nvPr>
+        </p:nvSpPr>
+        <p:spPr>
+          <a:xfrm>
+            <a:off x="1777275" y="2072936"/>
+            <a:ext cx="5484660" cy="4540928"/>
+          </a:xfrm>
+        </p:spPr>
+        <p:txBody>
+          <a:bodyPr>
+            <a:normAutofit/>
+          </a:bodyPr>
+          <a:lstStyle/>
+          <a:p>
+            <a:pPr marL="457200" indent="-457200">
+              <a:lnSpc>
+                <a:spcPct val="150000"/>
+              </a:lnSpc>
+              <a:buFont typeface="+mj-lt"/>
+              <a:buAutoNum type="arabicPeriod"/>
+            </a:pPr>
+            <a:r>
+              <a:rPr lang="en-US" dirty="0"/>
+              <a:t>Load Dataset</a:t>
+            </a:r>
+          </a:p>
+          <a:p>
+            <a:pPr marL="457200" indent="-457200">
+              <a:lnSpc>
+                <a:spcPct val="150000"/>
+              </a:lnSpc>
+              <a:buFont typeface="+mj-lt"/>
+              <a:buAutoNum type="arabicPeriod"/>
+            </a:pPr>
+            <a:r>
+              <a:rPr lang="en-US" dirty="0"/>
+              <a:t>Data Preprocessing</a:t>
+            </a:r>
+          </a:p>
+          <a:p>
+            <a:pPr marL="457200" indent="-457200">
+              <a:lnSpc>
+                <a:spcPct val="150000"/>
+              </a:lnSpc>
+              <a:buFont typeface="+mj-lt"/>
+              <a:buAutoNum type="arabicPeriod"/>
+            </a:pPr>
+            <a:r>
+              <a:rPr lang="en-US" dirty="0"/>
+              <a:t>Data Normalization</a:t>
+            </a:r>
+          </a:p>
+          <a:p>
+            <a:pPr marL="457200" indent="-457200">
+              <a:lnSpc>
+                <a:spcPct val="150000"/>
+              </a:lnSpc>
+              <a:buFont typeface="+mj-lt"/>
+              <a:buAutoNum type="arabicPeriod"/>
+            </a:pPr>
+            <a:r>
+              <a:rPr lang="en-US" dirty="0"/>
+              <a:t>Training The Model:  CNN &amp; LSTM</a:t>
+            </a:r>
+          </a:p>
+          <a:p>
+            <a:pPr marL="457200" indent="-457200">
+              <a:lnSpc>
+                <a:spcPct val="150000"/>
+              </a:lnSpc>
+              <a:buFont typeface="+mj-lt"/>
+              <a:buAutoNum type="arabicPeriod"/>
+            </a:pPr>
+            <a:r>
+              <a:rPr lang="en-US" dirty="0"/>
+              <a:t>Testing The Model</a:t>
+            </a:r>
+          </a:p>
+          <a:p>
+            <a:pPr marL="457200" indent="-457200">
+              <a:lnSpc>
+                <a:spcPct val="150000"/>
+              </a:lnSpc>
+              <a:buFont typeface="+mj-lt"/>
+              <a:buAutoNum type="arabicPeriod"/>
+            </a:pPr>
+            <a:r>
+              <a:rPr lang="en-US" dirty="0"/>
+              <a:t>Model Evaluation</a:t>
+            </a:r>
+          </a:p>
+          <a:p>
+            <a:pPr marL="0" indent="0">
+              <a:buNone/>
+            </a:pPr>
+            <a:endParaRPr lang="en-US" dirty="0"/>
+          </a:p>
+        </p:txBody>
+      </p:sp>
+    </p:spTree>
+    <p:extLst>
+      <p:ext uri="{BB962C8B-B14F-4D97-AF65-F5344CB8AC3E}">
+        <p14:creationId xmlns:p14="http://schemas.microsoft.com/office/powerpoint/2010/main" val="154340780"/>
+      </p:ext>
+    </p:extLst>
+  </p:cSld>
+  <p:clrMapOvr>
+    <a:masterClrMapping/>
+  </p:clrMapOvr>
+</p:sld>
+</file>
+
+<file path=ppt/slides/slide11.xml><?xml version="1.0" encoding="utf-8"?>
+<p:sld xmlns:a="http://schemas.openxmlformats.org/drawingml/2006/main" xmlns:r="http://schemas.openxmlformats.org/officeDocument/2006/relationships" xmlns:p="http://schemas.openxmlformats.org/presentationml/2006/main">
+  <p:cSld>
+    <p:spTree>
+      <p:nvGrpSpPr>
+        <p:cNvPr id="1" name=""/>
+        <p:cNvGrpSpPr/>
+        <p:nvPr/>
+      </p:nvGrpSpPr>
+      <p:grpSpPr>
+        <a:xfrm>
+          <a:off x="0" y="0"/>
+          <a:ext cx="0" cy="0"/>
+          <a:chOff x="0" y="0"/>
+          <a:chExt cx="0" cy="0"/>
+        </a:xfrm>
+      </p:grpSpPr>
+      <p:sp>
+        <p:nvSpPr>
+          <p:cNvPr id="2" name="Title 1">
+            <a:extLst>
+              <a:ext uri="{FF2B5EF4-FFF2-40B4-BE49-F238E27FC236}">
+                <a16:creationId xmlns="" xmlns:a16="http://schemas.microsoft.com/office/drawing/2014/main" id="{39151075-A8D7-7AF7-018D-6CA6C93D178A}"/>
               </a:ext>
             </a:extLst>
           </p:cNvPr>
@@ -10265,7 +10441,7 @@
           <p:cNvPr id="5" name="TextBox 4">
             <a:extLst>
               <a:ext uri="{FF2B5EF4-FFF2-40B4-BE49-F238E27FC236}">
-                <a16:creationId xmlns:a16="http://schemas.microsoft.com/office/drawing/2014/main" xmlns="" id="{E8A636A5-370A-8ECF-AECB-C8693839B949}"/>
+                <a16:creationId xmlns="" xmlns:a16="http://schemas.microsoft.com/office/drawing/2014/main" id="{E8A636A5-370A-8ECF-AECB-C8693839B949}"/>
               </a:ext>
             </a:extLst>
           </p:cNvPr>
@@ -10585,7 +10761,7 @@
           <p:cNvPr id="6" name="Picture 5" descr="A table of numbers and a few words&#10;&#10;Description automatically generated with medium confidence">
             <a:extLst>
               <a:ext uri="{FF2B5EF4-FFF2-40B4-BE49-F238E27FC236}">
-                <a16:creationId xmlns:a16="http://schemas.microsoft.com/office/drawing/2014/main" xmlns="" id="{00032004-846C-4543-3885-A0D5FCA18EE3}"/>
+                <a16:creationId xmlns="" xmlns:a16="http://schemas.microsoft.com/office/drawing/2014/main" id="{00032004-846C-4543-3885-A0D5FCA18EE3}"/>
               </a:ext>
             </a:extLst>
           </p:cNvPr>
@@ -10630,182 +10806,6 @@
 </p:sld>
 </file>
 
-<file path=ppt/slides/slide11.xml><?xml version="1.0" encoding="utf-8"?>
-<p:sld xmlns:a="http://schemas.openxmlformats.org/drawingml/2006/main" xmlns:r="http://schemas.openxmlformats.org/officeDocument/2006/relationships" xmlns:p="http://schemas.openxmlformats.org/presentationml/2006/main">
-  <p:cSld>
-    <p:spTree>
-      <p:nvGrpSpPr>
-        <p:cNvPr id="1" name=""/>
-        <p:cNvGrpSpPr/>
-        <p:nvPr/>
-      </p:nvGrpSpPr>
-      <p:grpSpPr>
-        <a:xfrm>
-          <a:off x="0" y="0"/>
-          <a:ext cx="0" cy="0"/>
-          <a:chOff x="0" y="0"/>
-          <a:chExt cx="0" cy="0"/>
-        </a:xfrm>
-      </p:grpSpPr>
-      <p:sp>
-        <p:nvSpPr>
-          <p:cNvPr id="2" name="Title 1">
-            <a:extLst>
-              <a:ext uri="{FF2B5EF4-FFF2-40B4-BE49-F238E27FC236}">
-                <a16:creationId xmlns:a16="http://schemas.microsoft.com/office/drawing/2014/main" xmlns="" id="{29C94A25-1010-C357-7BC4-494BA9F7A98B}"/>
-              </a:ext>
-            </a:extLst>
-          </p:cNvPr>
-          <p:cNvSpPr>
-            <a:spLocks noGrp="1"/>
-          </p:cNvSpPr>
-          <p:nvPr>
-            <p:ph type="title"/>
-          </p:nvPr>
-        </p:nvSpPr>
-        <p:spPr>
-          <a:xfrm>
-            <a:off x="1448800" y="320337"/>
-            <a:ext cx="10018713" cy="1752599"/>
-          </a:xfrm>
-        </p:spPr>
-        <p:txBody>
-          <a:bodyPr/>
-          <a:lstStyle/>
-          <a:p>
-            <a:r>
-              <a:rPr lang="en-US" dirty="0"/>
-              <a:t>System Implementation </a:t>
-            </a:r>
-          </a:p>
-        </p:txBody>
-      </p:sp>
-      <p:sp>
-        <p:nvSpPr>
-          <p:cNvPr id="3" name="Content Placeholder 2">
-            <a:extLst>
-              <a:ext uri="{FF2B5EF4-FFF2-40B4-BE49-F238E27FC236}">
-                <a16:creationId xmlns:a16="http://schemas.microsoft.com/office/drawing/2014/main" xmlns="" id="{91F0C63E-1E76-FC31-4D56-9C494553AAA7}"/>
-              </a:ext>
-            </a:extLst>
-          </p:cNvPr>
-          <p:cNvSpPr>
-            <a:spLocks noGrp="1"/>
-          </p:cNvSpPr>
-          <p:nvPr>
-            <p:ph idx="1"/>
-          </p:nvPr>
-        </p:nvSpPr>
-        <p:spPr>
-          <a:xfrm>
-            <a:off x="1777275" y="2072936"/>
-            <a:ext cx="5484660" cy="4540928"/>
-          </a:xfrm>
-        </p:spPr>
-        <p:txBody>
-          <a:bodyPr>
-            <a:normAutofit/>
-          </a:bodyPr>
-          <a:lstStyle/>
-          <a:p>
-            <a:pPr marL="457200" indent="-457200">
-              <a:lnSpc>
-                <a:spcPct val="150000"/>
-              </a:lnSpc>
-              <a:buFont typeface="+mj-lt"/>
-              <a:buAutoNum type="arabicPeriod"/>
-            </a:pPr>
-            <a:r>
-              <a:rPr lang="en-US" dirty="0"/>
-              <a:t>Load Dataset</a:t>
-            </a:r>
-          </a:p>
-          <a:p>
-            <a:pPr marL="457200" indent="-457200">
-              <a:lnSpc>
-                <a:spcPct val="150000"/>
-              </a:lnSpc>
-              <a:buFont typeface="+mj-lt"/>
-              <a:buAutoNum type="arabicPeriod"/>
-            </a:pPr>
-            <a:r>
-              <a:rPr lang="en-US" dirty="0"/>
-              <a:t>Data Preprocessing</a:t>
-            </a:r>
-          </a:p>
-          <a:p>
-            <a:pPr marL="457200" indent="-457200">
-              <a:lnSpc>
-                <a:spcPct val="150000"/>
-              </a:lnSpc>
-              <a:buFont typeface="+mj-lt"/>
-              <a:buAutoNum type="arabicPeriod"/>
-            </a:pPr>
-            <a:r>
-              <a:rPr lang="en-US" dirty="0"/>
-              <a:t>Data Normalization</a:t>
-            </a:r>
-          </a:p>
-          <a:p>
-            <a:pPr marL="457200" indent="-457200">
-              <a:lnSpc>
-                <a:spcPct val="150000"/>
-              </a:lnSpc>
-              <a:buFont typeface="+mj-lt"/>
-              <a:buAutoNum type="arabicPeriod"/>
-            </a:pPr>
-            <a:r>
-              <a:rPr lang="en-US" dirty="0"/>
-              <a:t>Training The Model:  CNN &amp; LSTM</a:t>
-            </a:r>
-          </a:p>
-          <a:p>
-            <a:pPr marL="457200" indent="-457200">
-              <a:lnSpc>
-                <a:spcPct val="150000"/>
-              </a:lnSpc>
-              <a:buFont typeface="+mj-lt"/>
-              <a:buAutoNum type="arabicPeriod"/>
-            </a:pPr>
-            <a:r>
-              <a:rPr lang="en-US" dirty="0"/>
-              <a:t>Testing The Model</a:t>
-            </a:r>
-          </a:p>
-          <a:p>
-            <a:pPr marL="457200" indent="-457200">
-              <a:lnSpc>
-                <a:spcPct val="150000"/>
-              </a:lnSpc>
-              <a:buFont typeface="+mj-lt"/>
-              <a:buAutoNum type="arabicPeriod"/>
-            </a:pPr>
-            <a:r>
-              <a:rPr lang="en-US" dirty="0"/>
-              <a:t>Model Evaluation</a:t>
-            </a:r>
-          </a:p>
-          <a:p>
-            <a:pPr marL="0" indent="0">
-              <a:buNone/>
-            </a:pPr>
-            <a:endParaRPr lang="en-US" dirty="0"/>
-          </a:p>
-        </p:txBody>
-      </p:sp>
-    </p:spTree>
-    <p:extLst>
-      <p:ext uri="{BB962C8B-B14F-4D97-AF65-F5344CB8AC3E}">
-        <p14:creationId xmlns:p14="http://schemas.microsoft.com/office/powerpoint/2010/main" val="154340780"/>
-      </p:ext>
-    </p:extLst>
-  </p:cSld>
-  <p:clrMapOvr>
-    <a:masterClrMapping/>
-  </p:clrMapOvr>
-</p:sld>
-</file>
-
 <file path=ppt/slides/slide12.xml><?xml version="1.0" encoding="utf-8"?>
 <p:sld xmlns:a="http://schemas.openxmlformats.org/drawingml/2006/main" xmlns:r="http://schemas.openxmlformats.org/officeDocument/2006/relationships" xmlns:p="http://schemas.openxmlformats.org/presentationml/2006/main">
   <p:cSld>
@@ -10828,7 +10828,7 @@
           <p:cNvPr id="2" name="Title 1">
             <a:extLst>
               <a:ext uri="{FF2B5EF4-FFF2-40B4-BE49-F238E27FC236}">
-                <a16:creationId xmlns:a16="http://schemas.microsoft.com/office/drawing/2014/main" xmlns="" id="{12E1E5D4-848B-8571-5618-4D74ABC7FDA2}"/>
+                <a16:creationId xmlns="" xmlns:a16="http://schemas.microsoft.com/office/drawing/2014/main" id="{12E1E5D4-848B-8571-5618-4D74ABC7FDA2}"/>
               </a:ext>
             </a:extLst>
           </p:cNvPr>
@@ -10891,7 +10891,7 @@
           <p:cNvPr id="2" name="Title 1">
             <a:extLst>
               <a:ext uri="{FF2B5EF4-FFF2-40B4-BE49-F238E27FC236}">
-                <a16:creationId xmlns:a16="http://schemas.microsoft.com/office/drawing/2014/main" xmlns="" id="{A0D4A5CB-782E-45C6-B46A-16991F79C5A6}"/>
+                <a16:creationId xmlns="" xmlns:a16="http://schemas.microsoft.com/office/drawing/2014/main" id="{A0D4A5CB-782E-45C6-B46A-16991F79C5A6}"/>
               </a:ext>
             </a:extLst>
           </p:cNvPr>
@@ -10931,7 +10931,7 @@
           <p:cNvPr id="3" name="Content Placeholder 2">
             <a:extLst>
               <a:ext uri="{FF2B5EF4-FFF2-40B4-BE49-F238E27FC236}">
-                <a16:creationId xmlns:a16="http://schemas.microsoft.com/office/drawing/2014/main" xmlns="" id="{E8E39FE1-3AED-461F-B0F7-1C140D9F81BE}"/>
+                <a16:creationId xmlns="" xmlns:a16="http://schemas.microsoft.com/office/drawing/2014/main" id="{E8E39FE1-3AED-461F-B0F7-1C140D9F81BE}"/>
               </a:ext>
             </a:extLst>
           </p:cNvPr>
@@ -11015,7 +11015,7 @@
           <p:cNvPr id="2" name="Title 1">
             <a:extLst>
               <a:ext uri="{FF2B5EF4-FFF2-40B4-BE49-F238E27FC236}">
-                <a16:creationId xmlns:a16="http://schemas.microsoft.com/office/drawing/2014/main" xmlns="" id="{9E9A9732-11C4-4050-A627-CAE64421F9D7}"/>
+                <a16:creationId xmlns="" xmlns:a16="http://schemas.microsoft.com/office/drawing/2014/main" id="{9E9A9732-11C4-4050-A627-CAE64421F9D7}"/>
               </a:ext>
             </a:extLst>
           </p:cNvPr>
@@ -11062,7 +11062,7 @@
           <p:cNvPr id="3" name="Content Placeholder 2">
             <a:extLst>
               <a:ext uri="{FF2B5EF4-FFF2-40B4-BE49-F238E27FC236}">
-                <a16:creationId xmlns:a16="http://schemas.microsoft.com/office/drawing/2014/main" xmlns="" id="{C9DC96D7-92FC-4870-AFE6-6B00541B4452}"/>
+                <a16:creationId xmlns="" xmlns:a16="http://schemas.microsoft.com/office/drawing/2014/main" id="{C9DC96D7-92FC-4870-AFE6-6B00541B4452}"/>
               </a:ext>
             </a:extLst>
           </p:cNvPr>
@@ -11175,7 +11175,7 @@
           <p:cNvPr id="4" name="Diagram 3">
             <a:extLst>
               <a:ext uri="{FF2B5EF4-FFF2-40B4-BE49-F238E27FC236}">
-                <a16:creationId xmlns:a16="http://schemas.microsoft.com/office/drawing/2014/main" xmlns="" id="{2F6A69D9-A376-4A04-955F-4718B2283831}"/>
+                <a16:creationId xmlns="" xmlns:a16="http://schemas.microsoft.com/office/drawing/2014/main" id="{2F6A69D9-A376-4A04-955F-4718B2283831}"/>
               </a:ext>
             </a:extLst>
           </p:cNvPr>
@@ -11233,7 +11233,7 @@
           <p:cNvPr id="2" name="Title 1">
             <a:extLst>
               <a:ext uri="{FF2B5EF4-FFF2-40B4-BE49-F238E27FC236}">
-                <a16:creationId xmlns:a16="http://schemas.microsoft.com/office/drawing/2014/main" xmlns="" id="{7E65EBC0-6D59-46E8-8F89-BCEE1C989312}"/>
+                <a16:creationId xmlns="" xmlns:a16="http://schemas.microsoft.com/office/drawing/2014/main" id="{7E65EBC0-6D59-46E8-8F89-BCEE1C989312}"/>
               </a:ext>
             </a:extLst>
           </p:cNvPr>
@@ -11280,7 +11280,7 @@
           <p:cNvPr id="3" name="Content Placeholder 2">
             <a:extLst>
               <a:ext uri="{FF2B5EF4-FFF2-40B4-BE49-F238E27FC236}">
-                <a16:creationId xmlns:a16="http://schemas.microsoft.com/office/drawing/2014/main" xmlns="" id="{C00F51FF-CFC3-459F-8089-5DE7D8455C55}"/>
+                <a16:creationId xmlns="" xmlns:a16="http://schemas.microsoft.com/office/drawing/2014/main" id="{C00F51FF-CFC3-459F-8089-5DE7D8455C55}"/>
               </a:ext>
             </a:extLst>
           </p:cNvPr>
@@ -11446,7 +11446,7 @@
           <p:cNvPr id="2" name="Title 1">
             <a:extLst>
               <a:ext uri="{FF2B5EF4-FFF2-40B4-BE49-F238E27FC236}">
-                <a16:creationId xmlns:a16="http://schemas.microsoft.com/office/drawing/2014/main" xmlns="" id="{65CE6BF2-0952-4436-A209-3ABB7948DEE4}"/>
+                <a16:creationId xmlns="" xmlns:a16="http://schemas.microsoft.com/office/drawing/2014/main" id="{65CE6BF2-0952-4436-A209-3ABB7948DEE4}"/>
               </a:ext>
             </a:extLst>
           </p:cNvPr>
@@ -11487,7 +11487,7 @@
           <p:cNvPr id="7" name="Content Placeholder 6">
             <a:extLst>
               <a:ext uri="{FF2B5EF4-FFF2-40B4-BE49-F238E27FC236}">
-                <a16:creationId xmlns:a16="http://schemas.microsoft.com/office/drawing/2014/main" xmlns="" id="{901BD474-40DF-4B6B-94A5-F74ED5C15B92}"/>
+                <a16:creationId xmlns="" xmlns:a16="http://schemas.microsoft.com/office/drawing/2014/main" id="{901BD474-40DF-4B6B-94A5-F74ED5C15B92}"/>
               </a:ext>
             </a:extLst>
           </p:cNvPr>
@@ -11521,7 +11521,7 @@
           <p:cNvPr id="8" name="TextBox 7">
             <a:extLst>
               <a:ext uri="{FF2B5EF4-FFF2-40B4-BE49-F238E27FC236}">
-                <a16:creationId xmlns:a16="http://schemas.microsoft.com/office/drawing/2014/main" xmlns="" id="{8EB48771-3924-48C6-8133-26A417A1BCD8}"/>
+                <a16:creationId xmlns="" xmlns:a16="http://schemas.microsoft.com/office/drawing/2014/main" id="{8EB48771-3924-48C6-8133-26A417A1BCD8}"/>
               </a:ext>
             </a:extLst>
           </p:cNvPr>
@@ -11580,7 +11580,7 @@
           <p:cNvPr id="4" name="Picture 3">
             <a:extLst>
               <a:ext uri="{FF2B5EF4-FFF2-40B4-BE49-F238E27FC236}">
-                <a16:creationId xmlns:a16="http://schemas.microsoft.com/office/drawing/2014/main" xmlns="" id="{B98D59D9-CA90-4752-AD79-911906C22FBF}"/>
+                <a16:creationId xmlns="" xmlns:a16="http://schemas.microsoft.com/office/drawing/2014/main" id="{B98D59D9-CA90-4752-AD79-911906C22FBF}"/>
               </a:ext>
             </a:extLst>
           </p:cNvPr>
@@ -11645,7 +11645,7 @@
           <p:cNvPr id="2" name="Title 1">
             <a:extLst>
               <a:ext uri="{FF2B5EF4-FFF2-40B4-BE49-F238E27FC236}">
-                <a16:creationId xmlns:a16="http://schemas.microsoft.com/office/drawing/2014/main" xmlns="" id="{43DBA58A-49B0-43C2-838F-A28268B56ED3}"/>
+                <a16:creationId xmlns="" xmlns:a16="http://schemas.microsoft.com/office/drawing/2014/main" id="{43DBA58A-49B0-43C2-838F-A28268B56ED3}"/>
               </a:ext>
             </a:extLst>
           </p:cNvPr>
@@ -11687,7 +11687,7 @@
           <p:cNvPr id="3" name="Content Placeholder 2">
             <a:extLst>
               <a:ext uri="{FF2B5EF4-FFF2-40B4-BE49-F238E27FC236}">
-                <a16:creationId xmlns:a16="http://schemas.microsoft.com/office/drawing/2014/main" xmlns="" id="{B2F70768-1D87-4696-AFA5-4A75DE072A53}"/>
+                <a16:creationId xmlns="" xmlns:a16="http://schemas.microsoft.com/office/drawing/2014/main" id="{B2F70768-1D87-4696-AFA5-4A75DE072A53}"/>
               </a:ext>
             </a:extLst>
           </p:cNvPr>
@@ -11823,7 +11823,7 @@
           <p:cNvPr id="5" name="Picture 4">
             <a:extLst>
               <a:ext uri="{FF2B5EF4-FFF2-40B4-BE49-F238E27FC236}">
-                <a16:creationId xmlns:a16="http://schemas.microsoft.com/office/drawing/2014/main" xmlns="" id="{F7C5C4CF-9E32-4F65-A6A3-90D5EC76C580}"/>
+                <a16:creationId xmlns="" xmlns:a16="http://schemas.microsoft.com/office/drawing/2014/main" id="{F7C5C4CF-9E32-4F65-A6A3-90D5EC76C580}"/>
               </a:ext>
             </a:extLst>
           </p:cNvPr>
@@ -11888,7 +11888,7 @@
           <p:cNvPr id="2" name="Title 1">
             <a:extLst>
               <a:ext uri="{FF2B5EF4-FFF2-40B4-BE49-F238E27FC236}">
-                <a16:creationId xmlns:a16="http://schemas.microsoft.com/office/drawing/2014/main" xmlns="" id="{3F15772D-783F-48CD-B999-750F1D21BC89}"/>
+                <a16:creationId xmlns="" xmlns:a16="http://schemas.microsoft.com/office/drawing/2014/main" id="{3F15772D-783F-48CD-B999-750F1D21BC89}"/>
               </a:ext>
             </a:extLst>
           </p:cNvPr>
@@ -11927,7 +11927,7 @@
           <p:cNvPr id="3" name="Content Placeholder 2">
             <a:extLst>
               <a:ext uri="{FF2B5EF4-FFF2-40B4-BE49-F238E27FC236}">
-                <a16:creationId xmlns:a16="http://schemas.microsoft.com/office/drawing/2014/main" xmlns="" id="{7C9979F5-3F86-4FDB-90AE-7FEBC96D3979}"/>
+                <a16:creationId xmlns="" xmlns:a16="http://schemas.microsoft.com/office/drawing/2014/main" id="{7C9979F5-3F86-4FDB-90AE-7FEBC96D3979}"/>
               </a:ext>
             </a:extLst>
           </p:cNvPr>
@@ -11992,7 +11992,7 @@
           <p:cNvPr id="5" name="Picture 4">
             <a:extLst>
               <a:ext uri="{FF2B5EF4-FFF2-40B4-BE49-F238E27FC236}">
-                <a16:creationId xmlns:a16="http://schemas.microsoft.com/office/drawing/2014/main" xmlns="" id="{CAEDA4C5-DD00-4987-A209-3753A8AEC5CA}"/>
+                <a16:creationId xmlns="" xmlns:a16="http://schemas.microsoft.com/office/drawing/2014/main" id="{CAEDA4C5-DD00-4987-A209-3753A8AEC5CA}"/>
               </a:ext>
             </a:extLst>
           </p:cNvPr>
@@ -12027,7 +12027,7 @@
           <p:cNvPr id="7" name="Picture 6">
             <a:extLst>
               <a:ext uri="{FF2B5EF4-FFF2-40B4-BE49-F238E27FC236}">
-                <a16:creationId xmlns:a16="http://schemas.microsoft.com/office/drawing/2014/main" xmlns="" id="{BFE2B4B6-D877-4673-8EE9-70B145CED45C}"/>
+                <a16:creationId xmlns="" xmlns:a16="http://schemas.microsoft.com/office/drawing/2014/main" id="{BFE2B4B6-D877-4673-8EE9-70B145CED45C}"/>
               </a:ext>
             </a:extLst>
           </p:cNvPr>
@@ -12092,7 +12092,7 @@
           <p:cNvPr id="2" name="Title 1">
             <a:extLst>
               <a:ext uri="{FF2B5EF4-FFF2-40B4-BE49-F238E27FC236}">
-                <a16:creationId xmlns:a16="http://schemas.microsoft.com/office/drawing/2014/main" xmlns="" id="{D2C9B450-3FBC-4889-8B49-FE57CA335482}"/>
+                <a16:creationId xmlns="" xmlns:a16="http://schemas.microsoft.com/office/drawing/2014/main" id="{D2C9B450-3FBC-4889-8B49-FE57CA335482}"/>
               </a:ext>
             </a:extLst>
           </p:cNvPr>
@@ -12131,7 +12131,7 @@
           <p:cNvPr id="3" name="Content Placeholder 2">
             <a:extLst>
               <a:ext uri="{FF2B5EF4-FFF2-40B4-BE49-F238E27FC236}">
-                <a16:creationId xmlns:a16="http://schemas.microsoft.com/office/drawing/2014/main" xmlns="" id="{5A9E8BA9-7501-42E3-9076-DA107F251857}"/>
+                <a16:creationId xmlns="" xmlns:a16="http://schemas.microsoft.com/office/drawing/2014/main" id="{5A9E8BA9-7501-42E3-9076-DA107F251857}"/>
               </a:ext>
             </a:extLst>
           </p:cNvPr>
@@ -12204,7 +12204,7 @@
           <p:cNvPr id="5" name="Picture 4">
             <a:extLst>
               <a:ext uri="{FF2B5EF4-FFF2-40B4-BE49-F238E27FC236}">
-                <a16:creationId xmlns:a16="http://schemas.microsoft.com/office/drawing/2014/main" xmlns="" id="{43EAA746-B3D3-466C-9844-A5714DA2CDC3}"/>
+                <a16:creationId xmlns="" xmlns:a16="http://schemas.microsoft.com/office/drawing/2014/main" id="{43EAA746-B3D3-466C-9844-A5714DA2CDC3}"/>
               </a:ext>
             </a:extLst>
           </p:cNvPr>
@@ -12239,7 +12239,7 @@
           <p:cNvPr id="7" name="Picture 6">
             <a:extLst>
               <a:ext uri="{FF2B5EF4-FFF2-40B4-BE49-F238E27FC236}">
-                <a16:creationId xmlns:a16="http://schemas.microsoft.com/office/drawing/2014/main" xmlns="" id="{E3C56211-3341-496E-AE79-726C6C2E9E5B}"/>
+                <a16:creationId xmlns="" xmlns:a16="http://schemas.microsoft.com/office/drawing/2014/main" id="{E3C56211-3341-496E-AE79-726C6C2E9E5B}"/>
               </a:ext>
             </a:extLst>
           </p:cNvPr>
@@ -12304,7 +12304,7 @@
           <p:cNvPr id="2" name="Title 1">
             <a:extLst>
               <a:ext uri="{FF2B5EF4-FFF2-40B4-BE49-F238E27FC236}">
-                <a16:creationId xmlns:a16="http://schemas.microsoft.com/office/drawing/2014/main" xmlns="" id="{BD9769A9-2302-4012-9F14-D15ED7C03F57}"/>
+                <a16:creationId xmlns="" xmlns:a16="http://schemas.microsoft.com/office/drawing/2014/main" id="{BD9769A9-2302-4012-9F14-D15ED7C03F57}"/>
               </a:ext>
             </a:extLst>
           </p:cNvPr>
@@ -12345,7 +12345,7 @@
           <p:cNvPr id="3" name="Content Placeholder 2">
             <a:extLst>
               <a:ext uri="{FF2B5EF4-FFF2-40B4-BE49-F238E27FC236}">
-                <a16:creationId xmlns:a16="http://schemas.microsoft.com/office/drawing/2014/main" xmlns="" id="{64F542E1-0E35-4AFC-AD7F-AA34CA1AC7E0}"/>
+                <a16:creationId xmlns="" xmlns:a16="http://schemas.microsoft.com/office/drawing/2014/main" id="{64F542E1-0E35-4AFC-AD7F-AA34CA1AC7E0}"/>
               </a:ext>
             </a:extLst>
           </p:cNvPr>
@@ -12398,7 +12398,7 @@
           <p:cNvPr id="5" name="Picture 4">
             <a:extLst>
               <a:ext uri="{FF2B5EF4-FFF2-40B4-BE49-F238E27FC236}">
-                <a16:creationId xmlns:a16="http://schemas.microsoft.com/office/drawing/2014/main" xmlns="" id="{569F340E-648C-45AB-8DC8-7FC634F67419}"/>
+                <a16:creationId xmlns="" xmlns:a16="http://schemas.microsoft.com/office/drawing/2014/main" id="{569F340E-648C-45AB-8DC8-7FC634F67419}"/>
               </a:ext>
             </a:extLst>
           </p:cNvPr>
@@ -12691,7 +12691,7 @@
   <a:extraClrSchemeLst/>
   <a:extLst>
     <a:ext uri="{05A4C25C-085E-4340-85A3-A5531E510DB2}">
-      <thm15:themeFamily xmlns:thm15="http://schemas.microsoft.com/office/thememl/2012/main" xmlns="" name="Parallax" id="{3388167B-A2EB-4685-9635-1831D9AEF8C4}" vid="{4F7A876A-7598-49CA-AFC8-8EDA2551E4A7}"/>
+      <thm15:themeFamily xmlns="" xmlns:thm15="http://schemas.microsoft.com/office/thememl/2012/main" name="Parallax" id="{3388167B-A2EB-4685-9635-1831D9AEF8C4}" vid="{4F7A876A-7598-49CA-AFC8-8EDA2551E4A7}"/>
     </a:ext>
   </a:extLst>
 </a:theme>

</xml_diff>